<commit_message>
Minor fix to architecture diagram.
</commit_message>
<xml_diff>
--- a/slides/end-to-end-ml-sm.pptx
+++ b/slides/end-to-end-ml-sm.pptx
@@ -1034,7 +1034,7 @@
             <a:fld id="{CA8E1BB1-B036-4140-B110-296DC0701D04}" type="datetime8">
               <a:rPr lang="en-US" smtClean="0"/>
               <a:pPr/>
-              <a:t>3/27/20 5:09 PM</a:t>
+              <a:t>3/27/20 5:45 PM</a:t>
             </a:fld>
             <a:endParaRPr lang="en-US" dirty="0"/>
           </a:p>
@@ -12262,7 +12262,7 @@
           <a:prstGeom prst="bentConnector2">
             <a:avLst/>
           </a:prstGeom>
-          <a:ln>
+          <a:ln w="22225">
             <a:solidFill>
               <a:schemeClr val="tx1">
                 <a:lumMod val="50000"/>
@@ -12271,6 +12271,7 @@
             <a:headEnd type="triangle"/>
             <a:tailEnd type="triangle"/>
           </a:ln>
+          <a:effectLst/>
         </p:spPr>
         <p:style>
           <a:lnRef idx="2">
@@ -12311,7 +12312,7 @@
           <a:prstGeom prst="bentConnector2">
             <a:avLst/>
           </a:prstGeom>
-          <a:ln>
+          <a:ln w="22225">
             <a:solidFill>
               <a:schemeClr val="tx1">
                 <a:lumMod val="50000"/>
@@ -12320,6 +12321,7 @@
             <a:headEnd type="triangle"/>
             <a:tailEnd type="triangle"/>
           </a:ln>
+          <a:effectLst/>
         </p:spPr>
         <p:style>
           <a:lnRef idx="2">
@@ -13183,6 +13185,58 @@
               </a:schemeClr>
             </a:solidFill>
             <a:prstDash val="sysDot"/>
+            <a:headEnd type="triangle"/>
+            <a:tailEnd type="triangle"/>
+          </a:ln>
+          <a:effectLst/>
+        </p:spPr>
+        <p:style>
+          <a:lnRef idx="2">
+            <a:schemeClr val="accent1"/>
+          </a:lnRef>
+          <a:fillRef idx="0">
+            <a:schemeClr val="accent1"/>
+          </a:fillRef>
+          <a:effectRef idx="1">
+            <a:schemeClr val="accent1"/>
+          </a:effectRef>
+          <a:fontRef idx="minor">
+            <a:schemeClr val="tx1"/>
+          </a:fontRef>
+        </p:style>
+      </p:cxnSp>
+      <p:cxnSp>
+        <p:nvCxnSpPr>
+          <p:cNvPr id="48" name="Elbow Connector 47">
+            <a:extLst>
+              <a:ext uri="{FF2B5EF4-FFF2-40B4-BE49-F238E27FC236}">
+                <a16:creationId xmlns:a16="http://schemas.microsoft.com/office/drawing/2014/main" id="{99E8B6AA-F870-F44F-8395-A5CD6C94480F}"/>
+              </a:ext>
+            </a:extLst>
+          </p:cNvPr>
+          <p:cNvCxnSpPr>
+            <a:cxnSpLocks/>
+            <a:stCxn id="54" idx="3"/>
+            <a:endCxn id="67" idx="1"/>
+          </p:cNvCxnSpPr>
+          <p:nvPr/>
+        </p:nvCxnSpPr>
+        <p:spPr>
+          <a:xfrm>
+            <a:off x="4793014" y="4601520"/>
+            <a:ext cx="3130847" cy="2296238"/>
+          </a:xfrm>
+          <a:prstGeom prst="bentConnector3">
+            <a:avLst>
+              <a:gd name="adj1" fmla="val 35636"/>
+            </a:avLst>
+          </a:prstGeom>
+          <a:ln w="22225">
+            <a:solidFill>
+              <a:schemeClr val="tx1">
+                <a:lumMod val="50000"/>
+              </a:schemeClr>
+            </a:solidFill>
             <a:headEnd type="triangle"/>
             <a:tailEnd type="triangle"/>
           </a:ln>
@@ -14557,15 +14611,6 @@
 </file>
 
 <file path=customXml/item1.xml><?xml version="1.0" encoding="utf-8"?>
-<?mso-contentType ?>
-<FormTemplates xmlns="http://schemas.microsoft.com/sharepoint/v3/contenttype/forms">
-  <Display>DocumentLibraryForm</Display>
-  <Edit>DocumentLibraryForm</Edit>
-  <New>DocumentLibraryForm</New>
-</FormTemplates>
-</file>
-
-<file path=customXml/item2.xml><?xml version="1.0" encoding="utf-8"?>
 <ct:contentTypeSchema xmlns:ct="http://schemas.microsoft.com/office/2006/metadata/contentType" xmlns:ma="http://schemas.microsoft.com/office/2006/metadata/properties/metaAttributes" ct:_="" ma:_="" ma:contentTypeName="Document" ma:contentTypeID="0x010100D26A3D6C04DFD740953BA1B2B9E62D60" ma:contentTypeVersion="0" ma:contentTypeDescription="Create a new document." ma:contentTypeScope="" ma:versionID="26617cd14cd3af163c0e97ff614e520a">
   <xsd:schema xmlns:xsd="http://www.w3.org/2001/XMLSchema" xmlns:xs="http://www.w3.org/2001/XMLSchema" xmlns:p="http://schemas.microsoft.com/office/2006/metadata/properties" targetNamespace="http://schemas.microsoft.com/office/2006/metadata/properties" ma:root="true" ma:fieldsID="c64490b4aec6201516c3a874156f37b2">
     <xsd:element name="properties">
@@ -14679,6 +14724,15 @@
 </ct:contentTypeSchema>
 </file>
 
+<file path=customXml/item2.xml><?xml version="1.0" encoding="utf-8"?>
+<?mso-contentType ?>
+<FormTemplates xmlns="http://schemas.microsoft.com/sharepoint/v3/contenttype/forms">
+  <Display>DocumentLibraryForm</Display>
+  <Edit>DocumentLibraryForm</Edit>
+  <New>DocumentLibraryForm</New>
+</FormTemplates>
+</file>
+
 <file path=customXml/item3.xml><?xml version="1.0" encoding="utf-8"?>
 <p:properties xmlns:p="http://schemas.microsoft.com/office/2006/metadata/properties" xmlns:xsi="http://www.w3.org/2001/XMLSchema-instance">
   <documentManagement/>
@@ -14686,14 +14740,6 @@
 </file>
 
 <file path=customXml/itemProps1.xml><?xml version="1.0" encoding="utf-8"?>
-<ds:datastoreItem xmlns:ds="http://schemas.openxmlformats.org/officeDocument/2006/customXml" ds:itemID="{705B35A6-8B52-46A5-AE45-B98C6459DC10}">
-  <ds:schemaRefs>
-    <ds:schemaRef ds:uri="http://schemas.microsoft.com/sharepoint/v3/contenttype/forms"/>
-  </ds:schemaRefs>
-</ds:datastoreItem>
-</file>
-
-<file path=customXml/itemProps2.xml><?xml version="1.0" encoding="utf-8"?>
 <ds:datastoreItem xmlns:ds="http://schemas.openxmlformats.org/officeDocument/2006/customXml" ds:itemID="{51A3258A-222C-4488-825E-7520D001FB75}">
   <ds:schemaRefs>
     <ds:schemaRef ds:uri="http://schemas.microsoft.com/office/2006/metadata/contentType"/>
@@ -14705,6 +14751,14 @@
     <ds:schemaRef ds:uri="http://purl.org/dc/terms/"/>
     <ds:schemaRef ds:uri="http://schemas.microsoft.com/internal/obd"/>
     <ds:schemaRef ds:uri="http://schemas.microsoft.com/office/infopath/2007/PartnerControls"/>
+  </ds:schemaRefs>
+</ds:datastoreItem>
+</file>
+
+<file path=customXml/itemProps2.xml><?xml version="1.0" encoding="utf-8"?>
+<ds:datastoreItem xmlns:ds="http://schemas.openxmlformats.org/officeDocument/2006/customXml" ds:itemID="{705B35A6-8B52-46A5-AE45-B98C6459DC10}">
+  <ds:schemaRefs>
+    <ds:schemaRef ds:uri="http://schemas.microsoft.com/sharepoint/v3/contenttype/forms"/>
   </ds:schemaRefs>
 </ds:datastoreItem>
 </file>

</xml_diff>

<commit_message>
Updatede architecture diagram and slides.
Updatede architecture diagram and slides.
</commit_message>
<xml_diff>
--- a/slides/end-to-end-ml-sm.pptx
+++ b/slides/end-to-end-ml-sm.pptx
@@ -365,7 +365,7 @@
           <a:p>
             <a:fld id="{D2887149-AF03-6142-908A-3DD284EAF54B}" type="datetimeFigureOut">
               <a:rPr lang="en-US" smtClean="0"/>
-              <a:t>3/27/20</a:t>
+              <a:t>10/21/20</a:t>
             </a:fld>
             <a:endParaRPr lang="en-US"/>
           </a:p>
@@ -547,7 +547,7 @@
             <a:fld id="{0B25AC41-3BEC-9247-8322-91B80C013F2D}" type="datetimeFigureOut">
               <a:rPr lang="en-US" smtClean="0"/>
               <a:pPr/>
-              <a:t>3/27/20</a:t>
+              <a:t>10/21/20</a:t>
             </a:fld>
             <a:endParaRPr lang="en-US" dirty="0"/>
           </a:p>
@@ -1034,7 +1034,7 @@
             <a:fld id="{CA8E1BB1-B036-4140-B110-296DC0701D04}" type="datetime8">
               <a:rPr lang="en-US" smtClean="0"/>
               <a:pPr/>
-              <a:t>3/27/20 5:45 PM</a:t>
+              <a:t>10/21/20 4:34 PM</a:t>
             </a:fld>
             <a:endParaRPr lang="en-US" dirty="0"/>
           </a:p>
@@ -1458,7 +1458,7 @@
   <p:clrMapOvr>
     <a:overrideClrMapping bg1="dk1" tx1="lt1" bg2="dk2" tx2="lt2" accent1="accent1" accent2="accent2" accent3="accent3" accent4="accent4" accent5="accent5" accent6="accent6" hlink="hlink" folHlink="folHlink"/>
   </p:clrMapOvr>
-  <p:extLst mod="1">
+  <p:extLst>
     <p:ext uri="{DCECCB84-F9BA-43D5-87BE-67443E8EF086}">
       <p15:sldGuideLst xmlns:p15="http://schemas.microsoft.com/office/powerpoint/2012/main"/>
     </p:ext>
@@ -5362,7 +5362,7 @@
   <p:clrMapOvr>
     <a:masterClrMapping/>
   </p:clrMapOvr>
-  <p:extLst mod="1">
+  <p:extLst>
     <p:ext uri="{DCECCB84-F9BA-43D5-87BE-67443E8EF086}">
       <p15:sldGuideLst xmlns:p15="http://schemas.microsoft.com/office/powerpoint/2012/main"/>
     </p:ext>
@@ -5930,7 +5930,6 @@
         </p:spPr>
       </p:pic>
     </p:spTree>
-    <p:extLst/>
   </p:cSld>
   <p:clrMapOvr>
     <a:masterClrMapping/>
@@ -6389,7 +6388,7 @@
   <p:clrMapOvr>
     <a:masterClrMapping/>
   </p:clrMapOvr>
-  <p:extLst mod="1">
+  <p:extLst>
     <p:ext uri="{DCECCB84-F9BA-43D5-87BE-67443E8EF086}">
       <p15:sldGuideLst xmlns:p15="http://schemas.microsoft.com/office/powerpoint/2012/main"/>
     </p:ext>
@@ -8431,7 +8430,7 @@
       </a:lvl9pPr>
     </p:otherStyle>
   </p:txStyles>
-  <p:extLst mod="1">
+  <p:extLst>
     <p:ext uri="{27BBF7A9-308A-43DC-89C8-2F10F3537804}">
       <p15:sldGuideLst xmlns:p15="http://schemas.microsoft.com/office/powerpoint/2012/main">
         <p15:guide id="1" pos="336" userDrawn="1">
@@ -11358,18 +11357,14 @@
             <a:pPr algn="ctr"/>
             <a:r>
               <a:rPr lang="en-US" sz="1400" dirty="0"/>
-              <a:t>Amazon </a:t>
-            </a:r>
-            <a:r>
-              <a:rPr lang="en-US" sz="1400" dirty="0" err="1"/>
-              <a:t>SageMaker</a:t>
+              <a:t>Amazon SageMaker</a:t>
             </a:r>
             <a:br>
               <a:rPr lang="en-US" sz="1400" dirty="0"/>
             </a:br>
             <a:r>
               <a:rPr lang="en-US" sz="1400" dirty="0"/>
-              <a:t>Notebook Instance</a:t>
+              <a:t>Studio</a:t>
             </a:r>
           </a:p>
         </p:txBody>
@@ -14611,6 +14606,15 @@
 </file>
 
 <file path=customXml/item1.xml><?xml version="1.0" encoding="utf-8"?>
+<?mso-contentType ?>
+<FormTemplates xmlns="http://schemas.microsoft.com/sharepoint/v3/contenttype/forms">
+  <Display>DocumentLibraryForm</Display>
+  <Edit>DocumentLibraryForm</Edit>
+  <New>DocumentLibraryForm</New>
+</FormTemplates>
+</file>
+
+<file path=customXml/item2.xml><?xml version="1.0" encoding="utf-8"?>
 <ct:contentTypeSchema xmlns:ct="http://schemas.microsoft.com/office/2006/metadata/contentType" xmlns:ma="http://schemas.microsoft.com/office/2006/metadata/properties/metaAttributes" ct:_="" ma:_="" ma:contentTypeName="Document" ma:contentTypeID="0x010100D26A3D6C04DFD740953BA1B2B9E62D60" ma:contentTypeVersion="0" ma:contentTypeDescription="Create a new document." ma:contentTypeScope="" ma:versionID="26617cd14cd3af163c0e97ff614e520a">
   <xsd:schema xmlns:xsd="http://www.w3.org/2001/XMLSchema" xmlns:xs="http://www.w3.org/2001/XMLSchema" xmlns:p="http://schemas.microsoft.com/office/2006/metadata/properties" targetNamespace="http://schemas.microsoft.com/office/2006/metadata/properties" ma:root="true" ma:fieldsID="c64490b4aec6201516c3a874156f37b2">
     <xsd:element name="properties">
@@ -14724,15 +14728,6 @@
 </ct:contentTypeSchema>
 </file>
 
-<file path=customXml/item2.xml><?xml version="1.0" encoding="utf-8"?>
-<?mso-contentType ?>
-<FormTemplates xmlns="http://schemas.microsoft.com/sharepoint/v3/contenttype/forms">
-  <Display>DocumentLibraryForm</Display>
-  <Edit>DocumentLibraryForm</Edit>
-  <New>DocumentLibraryForm</New>
-</FormTemplates>
-</file>
-
 <file path=customXml/item3.xml><?xml version="1.0" encoding="utf-8"?>
 <p:properties xmlns:p="http://schemas.microsoft.com/office/2006/metadata/properties" xmlns:xsi="http://www.w3.org/2001/XMLSchema-instance">
   <documentManagement/>
@@ -14740,6 +14735,14 @@
 </file>
 
 <file path=customXml/itemProps1.xml><?xml version="1.0" encoding="utf-8"?>
+<ds:datastoreItem xmlns:ds="http://schemas.openxmlformats.org/officeDocument/2006/customXml" ds:itemID="{705B35A6-8B52-46A5-AE45-B98C6459DC10}">
+  <ds:schemaRefs>
+    <ds:schemaRef ds:uri="http://schemas.microsoft.com/sharepoint/v3/contenttype/forms"/>
+  </ds:schemaRefs>
+</ds:datastoreItem>
+</file>
+
+<file path=customXml/itemProps2.xml><?xml version="1.0" encoding="utf-8"?>
 <ds:datastoreItem xmlns:ds="http://schemas.openxmlformats.org/officeDocument/2006/customXml" ds:itemID="{51A3258A-222C-4488-825E-7520D001FB75}">
   <ds:schemaRefs>
     <ds:schemaRef ds:uri="http://schemas.microsoft.com/office/2006/metadata/contentType"/>
@@ -14751,14 +14754,6 @@
     <ds:schemaRef ds:uri="http://purl.org/dc/terms/"/>
     <ds:schemaRef ds:uri="http://schemas.microsoft.com/internal/obd"/>
     <ds:schemaRef ds:uri="http://schemas.microsoft.com/office/infopath/2007/PartnerControls"/>
-  </ds:schemaRefs>
-</ds:datastoreItem>
-</file>
-
-<file path=customXml/itemProps2.xml><?xml version="1.0" encoding="utf-8"?>
-<ds:datastoreItem xmlns:ds="http://schemas.openxmlformats.org/officeDocument/2006/customXml" ds:itemID="{705B35A6-8B52-46A5-AE45-B98C6459DC10}">
-  <ds:schemaRefs>
-    <ds:schemaRef ds:uri="http://schemas.microsoft.com/sharepoint/v3/contenttype/forms"/>
   </ds:schemaRefs>
 </ds:datastoreItem>
 </file>

</xml_diff>

<commit_message>
Removed Cloud9 to leverage on simpler Lambda deployment.
Removed Cloud9 to leverage on simpler Lambda deployment.
</commit_message>
<xml_diff>
--- a/slides/end-to-end-ml-sm.pptx
+++ b/slides/end-to-end-ml-sm.pptx
@@ -365,7 +365,7 @@
           <a:p>
             <a:fld id="{D2887149-AF03-6142-908A-3DD284EAF54B}" type="datetimeFigureOut">
               <a:rPr lang="en-US" smtClean="0"/>
-              <a:t>10/21/20</a:t>
+              <a:t>4/13/21</a:t>
             </a:fld>
             <a:endParaRPr lang="en-US"/>
           </a:p>
@@ -547,7 +547,7 @@
             <a:fld id="{0B25AC41-3BEC-9247-8322-91B80C013F2D}" type="datetimeFigureOut">
               <a:rPr lang="en-US" smtClean="0"/>
               <a:pPr/>
-              <a:t>10/21/20</a:t>
+              <a:t>4/13/21</a:t>
             </a:fld>
             <a:endParaRPr lang="en-US" dirty="0"/>
           </a:p>
@@ -1034,7 +1034,7 @@
             <a:fld id="{CA8E1BB1-B036-4140-B110-296DC0701D04}" type="datetime8">
               <a:rPr lang="en-US" smtClean="0"/>
               <a:pPr/>
-              <a:t>10/21/20 4:34 PM</a:t>
+              <a:t>4/13/21 7:22 PM</a:t>
             </a:fld>
             <a:endParaRPr lang="en-US" dirty="0"/>
           </a:p>
@@ -1201,6 +1201,36 @@
           <a:chExt cx="0" cy="0"/>
         </a:xfrm>
       </p:grpSpPr>
+      <p:pic>
+        <p:nvPicPr>
+          <p:cNvPr id="8" name="Picture 7">
+            <a:extLst>
+              <a:ext uri="{FF2B5EF4-FFF2-40B4-BE49-F238E27FC236}">
+                <a16:creationId xmlns:a16="http://schemas.microsoft.com/office/drawing/2014/main" id="{14507AB0-DB53-A94D-B5A3-184B1B5135F8}"/>
+              </a:ext>
+            </a:extLst>
+          </p:cNvPr>
+          <p:cNvPicPr>
+            <a:picLocks noChangeAspect="1"/>
+          </p:cNvPicPr>
+          <p:nvPr userDrawn="1"/>
+        </p:nvPicPr>
+        <p:blipFill>
+          <a:blip r:embed="rId2"/>
+          <a:stretch>
+            <a:fillRect/>
+          </a:stretch>
+        </p:blipFill>
+        <p:spPr>
+          <a:xfrm>
+            <a:off x="0" y="0"/>
+            <a:ext cx="14630400" cy="8229600"/>
+          </a:xfrm>
+          <a:prstGeom prst="rect">
+            <a:avLst/>
+          </a:prstGeom>
+        </p:spPr>
+      </p:pic>
       <p:sp>
         <p:nvSpPr>
           <p:cNvPr id="6" name="Text Placeholder 11"/>
@@ -1383,7 +1413,7 @@
                 <a:ea typeface="Amazon Ember" panose="020B0603020204020204" pitchFamily="34" charset="0"/>
                 <a:cs typeface="Amazon Ember" panose="020B0603020204020204" pitchFamily="34" charset="0"/>
               </a:rPr>
-              <a:t>© 2019, Amazon Web Services, Inc. or its Affiliates. </a:t>
+              <a:t>© 2021, Amazon Web Services, Inc. or its Affiliates. </a:t>
             </a:r>
           </a:p>
         </p:txBody>
@@ -1394,36 +1424,6 @@
             <a:extLst>
               <a:ext uri="{FF2B5EF4-FFF2-40B4-BE49-F238E27FC236}">
                 <a16:creationId xmlns:a16="http://schemas.microsoft.com/office/drawing/2014/main" id="{C891604D-B9D9-2647-B8A8-7EC2243187E7}"/>
-              </a:ext>
-            </a:extLst>
-          </p:cNvPr>
-          <p:cNvPicPr>
-            <a:picLocks noChangeAspect="1"/>
-          </p:cNvPicPr>
-          <p:nvPr userDrawn="1"/>
-        </p:nvPicPr>
-        <p:blipFill>
-          <a:blip r:embed="rId2"/>
-          <a:stretch>
-            <a:fillRect/>
-          </a:stretch>
-        </p:blipFill>
-        <p:spPr>
-          <a:xfrm>
-            <a:off x="548640" y="742015"/>
-            <a:ext cx="1723844" cy="672008"/>
-          </a:xfrm>
-          <a:prstGeom prst="rect">
-            <a:avLst/>
-          </a:prstGeom>
-        </p:spPr>
-      </p:pic>
-      <p:pic>
-        <p:nvPicPr>
-          <p:cNvPr id="8" name="Picture 7">
-            <a:extLst>
-              <a:ext uri="{FF2B5EF4-FFF2-40B4-BE49-F238E27FC236}">
-                <a16:creationId xmlns:a16="http://schemas.microsoft.com/office/drawing/2014/main" id="{14507AB0-DB53-A94D-B5A3-184B1B5135F8}"/>
               </a:ext>
             </a:extLst>
           </p:cNvPr>
@@ -1440,8 +1440,8 @@
         </p:blipFill>
         <p:spPr>
           <a:xfrm>
-            <a:off x="0" y="0"/>
-            <a:ext cx="14630400" cy="8229600"/>
+            <a:off x="548640" y="742015"/>
+            <a:ext cx="1723844" cy="672008"/>
           </a:xfrm>
           <a:prstGeom prst="rect">
             <a:avLst/>
@@ -5105,6 +5105,36 @@
           <a:chExt cx="0" cy="0"/>
         </a:xfrm>
       </p:grpSpPr>
+      <p:pic>
+        <p:nvPicPr>
+          <p:cNvPr id="3" name="Picture 2">
+            <a:extLst>
+              <a:ext uri="{FF2B5EF4-FFF2-40B4-BE49-F238E27FC236}">
+                <a16:creationId xmlns:a16="http://schemas.microsoft.com/office/drawing/2014/main" id="{693DADAF-C957-824E-A77C-2E5530DDCE8E}"/>
+              </a:ext>
+            </a:extLst>
+          </p:cNvPr>
+          <p:cNvPicPr>
+            <a:picLocks noChangeAspect="1"/>
+          </p:cNvPicPr>
+          <p:nvPr userDrawn="1"/>
+        </p:nvPicPr>
+        <p:blipFill>
+          <a:blip r:embed="rId2"/>
+          <a:stretch>
+            <a:fillRect/>
+          </a:stretch>
+        </p:blipFill>
+        <p:spPr>
+          <a:xfrm>
+            <a:off x="0" y="0"/>
+            <a:ext cx="14630400" cy="8229600"/>
+          </a:xfrm>
+          <a:prstGeom prst="rect">
+            <a:avLst/>
+          </a:prstGeom>
+        </p:spPr>
+      </p:pic>
       <p:sp>
         <p:nvSpPr>
           <p:cNvPr id="6" name="Text Placeholder 11"/>
@@ -5287,7 +5317,7 @@
                 <a:ea typeface="Amazon Ember" panose="020B0603020204020204" pitchFamily="34" charset="0"/>
                 <a:cs typeface="Amazon Ember" panose="020B0603020204020204" pitchFamily="34" charset="0"/>
               </a:rPr>
-              <a:t>© 2019, Amazon Web Services, Inc. or its Affiliates. </a:t>
+              <a:t>© 2021, Amazon Web Services, Inc. or its Affiliates. </a:t>
             </a:r>
           </a:p>
         </p:txBody>
@@ -5298,36 +5328,6 @@
             <a:extLst>
               <a:ext uri="{FF2B5EF4-FFF2-40B4-BE49-F238E27FC236}">
                 <a16:creationId xmlns:a16="http://schemas.microsoft.com/office/drawing/2014/main" id="{85A07A38-0B5B-384E-9BC4-8F097BB2E6B8}"/>
-              </a:ext>
-            </a:extLst>
-          </p:cNvPr>
-          <p:cNvPicPr>
-            <a:picLocks noChangeAspect="1"/>
-          </p:cNvPicPr>
-          <p:nvPr userDrawn="1"/>
-        </p:nvPicPr>
-        <p:blipFill>
-          <a:blip r:embed="rId2"/>
-          <a:stretch>
-            <a:fillRect/>
-          </a:stretch>
-        </p:blipFill>
-        <p:spPr>
-          <a:xfrm>
-            <a:off x="548640" y="742015"/>
-            <a:ext cx="1723844" cy="672008"/>
-          </a:xfrm>
-          <a:prstGeom prst="rect">
-            <a:avLst/>
-          </a:prstGeom>
-        </p:spPr>
-      </p:pic>
-      <p:pic>
-        <p:nvPicPr>
-          <p:cNvPr id="3" name="Picture 2">
-            <a:extLst>
-              <a:ext uri="{FF2B5EF4-FFF2-40B4-BE49-F238E27FC236}">
-                <a16:creationId xmlns:a16="http://schemas.microsoft.com/office/drawing/2014/main" id="{693DADAF-C957-824E-A77C-2E5530DDCE8E}"/>
               </a:ext>
             </a:extLst>
           </p:cNvPr>
@@ -5344,8 +5344,8 @@
         </p:blipFill>
         <p:spPr>
           <a:xfrm>
-            <a:off x="0" y="0"/>
-            <a:ext cx="14630400" cy="8229600"/>
+            <a:off x="548640" y="742015"/>
+            <a:ext cx="1723844" cy="672008"/>
           </a:xfrm>
           <a:prstGeom prst="rect">
             <a:avLst/>
@@ -5665,240 +5665,6 @@
           <a:chExt cx="0" cy="0"/>
         </a:xfrm>
       </p:grpSpPr>
-      <p:sp>
-        <p:nvSpPr>
-          <p:cNvPr id="4" name="TextBox 3"/>
-          <p:cNvSpPr txBox="1"/>
-          <p:nvPr userDrawn="1"/>
-        </p:nvSpPr>
-        <p:spPr>
-          <a:xfrm>
-            <a:off x="4516341" y="-4548146"/>
-            <a:ext cx="184731" cy="801438"/>
-          </a:xfrm>
-          <a:prstGeom prst="rect">
-            <a:avLst/>
-          </a:prstGeom>
-          <a:noFill/>
-        </p:spPr>
-        <p:txBody>
-          <a:bodyPr wrap="none" rtlCol="0">
-            <a:spAutoFit/>
-          </a:bodyPr>
-          <a:lstStyle/>
-          <a:p>
-            <a:endParaRPr lang="en-US" sz="4608" dirty="0"/>
-          </a:p>
-        </p:txBody>
-      </p:sp>
-      <p:sp>
-        <p:nvSpPr>
-          <p:cNvPr id="6" name="TextBox 5"/>
-          <p:cNvSpPr txBox="1"/>
-          <p:nvPr userDrawn="1"/>
-        </p:nvSpPr>
-        <p:spPr>
-          <a:xfrm>
-            <a:off x="11897959" y="9767944"/>
-            <a:ext cx="184731" cy="801438"/>
-          </a:xfrm>
-          <a:prstGeom prst="rect">
-            <a:avLst/>
-          </a:prstGeom>
-          <a:noFill/>
-        </p:spPr>
-        <p:txBody>
-          <a:bodyPr wrap="none" rtlCol="0">
-            <a:spAutoFit/>
-          </a:bodyPr>
-          <a:lstStyle/>
-          <a:p>
-            <a:endParaRPr lang="en-US" sz="4608"/>
-          </a:p>
-        </p:txBody>
-      </p:sp>
-      <p:sp>
-        <p:nvSpPr>
-          <p:cNvPr id="10" name="Title 1"/>
-          <p:cNvSpPr>
-            <a:spLocks noGrp="1"/>
-          </p:cNvSpPr>
-          <p:nvPr>
-            <p:ph type="title"/>
-          </p:nvPr>
-        </p:nvSpPr>
-        <p:spPr>
-          <a:xfrm>
-            <a:off x="548640" y="2589430"/>
-            <a:ext cx="10660674" cy="1127019"/>
-          </a:xfrm>
-        </p:spPr>
-        <p:txBody>
-          <a:bodyPr anchor="ctr" anchorCtr="0">
-            <a:noAutofit/>
-          </a:bodyPr>
-          <a:lstStyle>
-            <a:lvl1pPr algn="l">
-              <a:defRPr sz="6400"/>
-            </a:lvl1pPr>
-          </a:lstStyle>
-          <a:p>
-            <a:r>
-              <a:rPr lang="en-US" dirty="0"/>
-              <a:t>Click to edit Master title style</a:t>
-            </a:r>
-          </a:p>
-        </p:txBody>
-      </p:sp>
-      <p:sp>
-        <p:nvSpPr>
-          <p:cNvPr id="3" name="Text Placeholder 2">
-            <a:extLst>
-              <a:ext uri="{FF2B5EF4-FFF2-40B4-BE49-F238E27FC236}">
-                <a16:creationId xmlns:a16="http://schemas.microsoft.com/office/drawing/2014/main" id="{9976E15E-156A-6740-8723-C74DD4148FEE}"/>
-              </a:ext>
-            </a:extLst>
-          </p:cNvPr>
-          <p:cNvSpPr>
-            <a:spLocks noGrp="1"/>
-          </p:cNvSpPr>
-          <p:nvPr>
-            <p:ph type="body" sz="quarter" idx="10"/>
-          </p:nvPr>
-        </p:nvSpPr>
-        <p:spPr>
-          <a:xfrm>
-            <a:off x="548640" y="3716448"/>
-            <a:ext cx="6380480" cy="792480"/>
-          </a:xfrm>
-          <a:prstGeom prst="rect">
-            <a:avLst/>
-          </a:prstGeom>
-        </p:spPr>
-        <p:txBody>
-          <a:bodyPr/>
-          <a:lstStyle/>
-          <a:p>
-            <a:pPr lvl="0"/>
-            <a:r>
-              <a:rPr lang="en-US" dirty="0"/>
-              <a:t>Edit Master text styles</a:t>
-            </a:r>
-          </a:p>
-        </p:txBody>
-      </p:sp>
-      <p:sp>
-        <p:nvSpPr>
-          <p:cNvPr id="14" name="Text Placeholder 11">
-            <a:extLst>
-              <a:ext uri="{FF2B5EF4-FFF2-40B4-BE49-F238E27FC236}">
-                <a16:creationId xmlns:a16="http://schemas.microsoft.com/office/drawing/2014/main" id="{2B3CA729-7DC1-3A41-B24F-C56CB70A70FE}"/>
-              </a:ext>
-            </a:extLst>
-          </p:cNvPr>
-          <p:cNvSpPr>
-            <a:spLocks noGrp="1"/>
-          </p:cNvSpPr>
-          <p:nvPr>
-            <p:ph type="body" sz="quarter" idx="11" hasCustomPrompt="1"/>
-          </p:nvPr>
-        </p:nvSpPr>
-        <p:spPr>
-          <a:xfrm>
-            <a:off x="548640" y="5950356"/>
-            <a:ext cx="5892800" cy="996597"/>
-          </a:xfrm>
-          <a:prstGeom prst="rect">
-            <a:avLst/>
-          </a:prstGeom>
-        </p:spPr>
-        <p:txBody>
-          <a:bodyPr>
-            <a:normAutofit/>
-          </a:bodyPr>
-          <a:lstStyle>
-            <a:lvl1pPr marL="0" indent="0" algn="l">
-              <a:buNone/>
-              <a:defRPr sz="2600" baseline="0"/>
-            </a:lvl1pPr>
-          </a:lstStyle>
-          <a:p>
-            <a:pPr lvl="0"/>
-            <a:r>
-              <a:rPr lang="en-US" dirty="0"/>
-              <a:t>Click to edit Presenter, Team</a:t>
-            </a:r>
-          </a:p>
-          <a:p>
-            <a:pPr lvl="0"/>
-            <a:r>
-              <a:rPr lang="en-US" dirty="0"/>
-              <a:t>Date, location</a:t>
-            </a:r>
-          </a:p>
-        </p:txBody>
-      </p:sp>
-      <p:sp>
-        <p:nvSpPr>
-          <p:cNvPr id="11" name="TextBox 10">
-            <a:extLst>
-              <a:ext uri="{FF2B5EF4-FFF2-40B4-BE49-F238E27FC236}">
-                <a16:creationId xmlns:a16="http://schemas.microsoft.com/office/drawing/2014/main" id="{F8B67D2B-BBD1-B546-A8C7-1FAD2B60374A}"/>
-              </a:ext>
-            </a:extLst>
-          </p:cNvPr>
-          <p:cNvSpPr txBox="1"/>
-          <p:nvPr userDrawn="1"/>
-        </p:nvSpPr>
-        <p:spPr>
-          <a:xfrm>
-            <a:off x="538863" y="7683901"/>
-            <a:ext cx="7115490" cy="172355"/>
-          </a:xfrm>
-          <a:prstGeom prst="rect">
-            <a:avLst/>
-          </a:prstGeom>
-          <a:noFill/>
-        </p:spPr>
-        <p:txBody>
-          <a:bodyPr wrap="square" lIns="0" tIns="0" rIns="0" bIns="0" rtlCol="0">
-            <a:spAutoFit/>
-          </a:bodyPr>
-          <a:lstStyle/>
-          <a:p>
-            <a:pPr marL="0" marR="0" indent="0" algn="l" defTabSz="731520" rtl="0" eaLnBrk="1" fontAlgn="auto" latinLnBrk="0" hangingPunct="1">
-              <a:lnSpc>
-                <a:spcPct val="100000"/>
-              </a:lnSpc>
-              <a:spcBef>
-                <a:spcPts val="0"/>
-              </a:spcBef>
-              <a:spcAft>
-                <a:spcPts val="0"/>
-              </a:spcAft>
-              <a:buClrTx/>
-              <a:buSzTx/>
-              <a:buFontTx/>
-              <a:buNone/>
-              <a:tabLst/>
-              <a:defRPr/>
-            </a:pPr>
-            <a:r>
-              <a:rPr lang="en-US" sz="1120" b="0" i="0" dirty="0">
-                <a:solidFill>
-                  <a:schemeClr val="tx1">
-                    <a:lumMod val="50000"/>
-                  </a:schemeClr>
-                </a:solidFill>
-                <a:latin typeface="Amazon Ember" panose="020B0603020204020204" pitchFamily="34" charset="0"/>
-                <a:ea typeface="Amazon Ember" panose="020B0603020204020204" pitchFamily="34" charset="0"/>
-                <a:cs typeface="Amazon Ember" panose="020B0603020204020204" pitchFamily="34" charset="0"/>
-              </a:rPr>
-              <a:t>© 2019, Amazon Web Services, Inc. or its Affiliates. </a:t>
-            </a:r>
-          </a:p>
-        </p:txBody>
-      </p:sp>
       <p:pic>
         <p:nvPicPr>
           <p:cNvPr id="9" name="Picture 8">
@@ -5929,6 +5695,179 @@
           </a:prstGeom>
         </p:spPr>
       </p:pic>
+      <p:sp>
+        <p:nvSpPr>
+          <p:cNvPr id="4" name="TextBox 3"/>
+          <p:cNvSpPr txBox="1"/>
+          <p:nvPr userDrawn="1"/>
+        </p:nvSpPr>
+        <p:spPr>
+          <a:xfrm>
+            <a:off x="4516341" y="-4548146"/>
+            <a:ext cx="184731" cy="801438"/>
+          </a:xfrm>
+          <a:prstGeom prst="rect">
+            <a:avLst/>
+          </a:prstGeom>
+          <a:noFill/>
+        </p:spPr>
+        <p:txBody>
+          <a:bodyPr wrap="none" rtlCol="0">
+            <a:spAutoFit/>
+          </a:bodyPr>
+          <a:lstStyle/>
+          <a:p>
+            <a:endParaRPr lang="en-US" sz="4608" dirty="0"/>
+          </a:p>
+        </p:txBody>
+      </p:sp>
+      <p:sp>
+        <p:nvSpPr>
+          <p:cNvPr id="6" name="TextBox 5"/>
+          <p:cNvSpPr txBox="1"/>
+          <p:nvPr userDrawn="1"/>
+        </p:nvSpPr>
+        <p:spPr>
+          <a:xfrm>
+            <a:off x="11897959" y="9767944"/>
+            <a:ext cx="184731" cy="801438"/>
+          </a:xfrm>
+          <a:prstGeom prst="rect">
+            <a:avLst/>
+          </a:prstGeom>
+          <a:noFill/>
+        </p:spPr>
+        <p:txBody>
+          <a:bodyPr wrap="none" rtlCol="0">
+            <a:spAutoFit/>
+          </a:bodyPr>
+          <a:lstStyle/>
+          <a:p>
+            <a:endParaRPr lang="en-US" sz="4608"/>
+          </a:p>
+        </p:txBody>
+      </p:sp>
+      <p:sp>
+        <p:nvSpPr>
+          <p:cNvPr id="10" name="Title 1"/>
+          <p:cNvSpPr>
+            <a:spLocks noGrp="1"/>
+          </p:cNvSpPr>
+          <p:nvPr>
+            <p:ph type="title"/>
+          </p:nvPr>
+        </p:nvSpPr>
+        <p:spPr>
+          <a:xfrm>
+            <a:off x="548640" y="2589430"/>
+            <a:ext cx="10660674" cy="1127019"/>
+          </a:xfrm>
+        </p:spPr>
+        <p:txBody>
+          <a:bodyPr anchor="ctr" anchorCtr="0">
+            <a:noAutofit/>
+          </a:bodyPr>
+          <a:lstStyle>
+            <a:lvl1pPr algn="l">
+              <a:defRPr sz="6400"/>
+            </a:lvl1pPr>
+          </a:lstStyle>
+          <a:p>
+            <a:r>
+              <a:rPr lang="en-US" dirty="0"/>
+              <a:t>Click to edit Master title style</a:t>
+            </a:r>
+          </a:p>
+        </p:txBody>
+      </p:sp>
+      <p:sp>
+        <p:nvSpPr>
+          <p:cNvPr id="3" name="Text Placeholder 2">
+            <a:extLst>
+              <a:ext uri="{FF2B5EF4-FFF2-40B4-BE49-F238E27FC236}">
+                <a16:creationId xmlns:a16="http://schemas.microsoft.com/office/drawing/2014/main" id="{9976E15E-156A-6740-8723-C74DD4148FEE}"/>
+              </a:ext>
+            </a:extLst>
+          </p:cNvPr>
+          <p:cNvSpPr>
+            <a:spLocks noGrp="1"/>
+          </p:cNvSpPr>
+          <p:nvPr>
+            <p:ph type="body" sz="quarter" idx="10"/>
+          </p:nvPr>
+        </p:nvSpPr>
+        <p:spPr>
+          <a:xfrm>
+            <a:off x="548640" y="3716448"/>
+            <a:ext cx="6380480" cy="792480"/>
+          </a:xfrm>
+          <a:prstGeom prst="rect">
+            <a:avLst/>
+          </a:prstGeom>
+        </p:spPr>
+        <p:txBody>
+          <a:bodyPr/>
+          <a:lstStyle/>
+          <a:p>
+            <a:pPr lvl="0"/>
+            <a:r>
+              <a:rPr lang="en-US" dirty="0"/>
+              <a:t>Edit Master text styles</a:t>
+            </a:r>
+          </a:p>
+        </p:txBody>
+      </p:sp>
+      <p:sp>
+        <p:nvSpPr>
+          <p:cNvPr id="14" name="Text Placeholder 11">
+            <a:extLst>
+              <a:ext uri="{FF2B5EF4-FFF2-40B4-BE49-F238E27FC236}">
+                <a16:creationId xmlns:a16="http://schemas.microsoft.com/office/drawing/2014/main" id="{2B3CA729-7DC1-3A41-B24F-C56CB70A70FE}"/>
+              </a:ext>
+            </a:extLst>
+          </p:cNvPr>
+          <p:cNvSpPr>
+            <a:spLocks noGrp="1"/>
+          </p:cNvSpPr>
+          <p:nvPr>
+            <p:ph type="body" sz="quarter" idx="11" hasCustomPrompt="1"/>
+          </p:nvPr>
+        </p:nvSpPr>
+        <p:spPr>
+          <a:xfrm>
+            <a:off x="548640" y="5950356"/>
+            <a:ext cx="5892800" cy="996597"/>
+          </a:xfrm>
+          <a:prstGeom prst="rect">
+            <a:avLst/>
+          </a:prstGeom>
+        </p:spPr>
+        <p:txBody>
+          <a:bodyPr>
+            <a:normAutofit/>
+          </a:bodyPr>
+          <a:lstStyle>
+            <a:lvl1pPr marL="0" indent="0" algn="l">
+              <a:buNone/>
+              <a:defRPr sz="2600" baseline="0"/>
+            </a:lvl1pPr>
+          </a:lstStyle>
+          <a:p>
+            <a:pPr lvl="0"/>
+            <a:r>
+              <a:rPr lang="en-US" dirty="0"/>
+              <a:t>Click to edit Presenter, Team</a:t>
+            </a:r>
+          </a:p>
+          <a:p>
+            <a:pPr lvl="0"/>
+            <a:r>
+              <a:rPr lang="en-US" dirty="0"/>
+              <a:t>Date, location</a:t>
+            </a:r>
+          </a:p>
+        </p:txBody>
+      </p:sp>
     </p:spTree>
   </p:cSld>
   <p:clrMapOvr>
@@ -5954,6 +5893,36 @@
           <a:chExt cx="0" cy="0"/>
         </a:xfrm>
       </p:grpSpPr>
+      <p:pic>
+        <p:nvPicPr>
+          <p:cNvPr id="11" name="Picture 10">
+            <a:extLst>
+              <a:ext uri="{FF2B5EF4-FFF2-40B4-BE49-F238E27FC236}">
+                <a16:creationId xmlns:a16="http://schemas.microsoft.com/office/drawing/2014/main" id="{DED433EB-7B9D-9B41-8C8F-4F97525C6141}"/>
+              </a:ext>
+            </a:extLst>
+          </p:cNvPr>
+          <p:cNvPicPr>
+            <a:picLocks noChangeAspect="1"/>
+          </p:cNvPicPr>
+          <p:nvPr userDrawn="1"/>
+        </p:nvPicPr>
+        <p:blipFill>
+          <a:blip r:embed="rId2"/>
+          <a:stretch>
+            <a:fillRect/>
+          </a:stretch>
+        </p:blipFill>
+        <p:spPr>
+          <a:xfrm>
+            <a:off x="0" y="0"/>
+            <a:ext cx="14630400" cy="8229600"/>
+          </a:xfrm>
+          <a:prstGeom prst="rect">
+            <a:avLst/>
+          </a:prstGeom>
+        </p:spPr>
+      </p:pic>
       <p:sp>
         <p:nvSpPr>
           <p:cNvPr id="2" name="Title 1"/>
@@ -6085,41 +6054,11 @@
                 <a:ea typeface="Amazon Ember" panose="020B0603020204020204" pitchFamily="34" charset="0"/>
                 <a:cs typeface="Amazon Ember" panose="020B0603020204020204" pitchFamily="34" charset="0"/>
               </a:rPr>
-              <a:t>© 2019, Amazon Web Services, Inc. or its Affiliates. </a:t>
-            </a:r>
-          </a:p>
-        </p:txBody>
-      </p:sp>
-      <p:pic>
-        <p:nvPicPr>
-          <p:cNvPr id="11" name="Picture 10">
-            <a:extLst>
-              <a:ext uri="{FF2B5EF4-FFF2-40B4-BE49-F238E27FC236}">
-                <a16:creationId xmlns:a16="http://schemas.microsoft.com/office/drawing/2014/main" id="{DED433EB-7B9D-9B41-8C8F-4F97525C6141}"/>
-              </a:ext>
-            </a:extLst>
-          </p:cNvPr>
-          <p:cNvPicPr>
-            <a:picLocks noChangeAspect="1"/>
-          </p:cNvPicPr>
-          <p:nvPr userDrawn="1"/>
-        </p:nvPicPr>
-        <p:blipFill>
-          <a:blip r:embed="rId2"/>
-          <a:stretch>
-            <a:fillRect/>
-          </a:stretch>
-        </p:blipFill>
-        <p:spPr>
-          <a:xfrm>
-            <a:off x="0" y="0"/>
-            <a:ext cx="14630400" cy="8229600"/>
-          </a:xfrm>
-          <a:prstGeom prst="rect">
-            <a:avLst/>
-          </a:prstGeom>
-        </p:spPr>
-      </p:pic>
+              <a:t>© 2021, Amazon Web Services, Inc. or its Affiliates. </a:t>
+            </a:r>
+          </a:p>
+        </p:txBody>
+      </p:sp>
       <p:pic>
         <p:nvPicPr>
           <p:cNvPr id="12" name="Picture 11">
@@ -6478,287 +6417,6 @@
 </p:sldLayout>
 </file>
 
-<file path=ppt/slideLayouts/slideLayout28.xml><?xml version="1.0" encoding="utf-8"?>
-<p:sldLayout xmlns:a="http://schemas.openxmlformats.org/drawingml/2006/main" xmlns:r="http://schemas.openxmlformats.org/officeDocument/2006/relationships" xmlns:p="http://schemas.openxmlformats.org/presentationml/2006/main" showMasterSp="0" userDrawn="1">
-  <p:cSld name="Title_Only">
-    <p:bg>
-      <p:bgPr>
-        <a:gradFill>
-          <a:gsLst>
-            <a:gs pos="0">
-              <a:srgbClr val="00045B"/>
-            </a:gs>
-            <a:gs pos="100000">
-              <a:schemeClr val="tx1"/>
-            </a:gs>
-          </a:gsLst>
-          <a:path path="circle">
-            <a:fillToRect l="100000" t="100000"/>
-          </a:path>
-        </a:gradFill>
-        <a:effectLst/>
-      </p:bgPr>
-    </p:bg>
-    <p:spTree>
-      <p:nvGrpSpPr>
-        <p:cNvPr id="1" name=""/>
-        <p:cNvGrpSpPr/>
-        <p:nvPr/>
-      </p:nvGrpSpPr>
-      <p:grpSpPr>
-        <a:xfrm>
-          <a:off x="0" y="0"/>
-          <a:ext cx="0" cy="0"/>
-          <a:chOff x="0" y="0"/>
-          <a:chExt cx="0" cy="0"/>
-        </a:xfrm>
-      </p:grpSpPr>
-      <p:sp>
-        <p:nvSpPr>
-          <p:cNvPr id="2" name="Title 1"/>
-          <p:cNvSpPr>
-            <a:spLocks noGrp="1"/>
-          </p:cNvSpPr>
-          <p:nvPr>
-            <p:ph type="title" hasCustomPrompt="1"/>
-          </p:nvPr>
-        </p:nvSpPr>
-        <p:spPr/>
-        <p:txBody>
-          <a:bodyPr lIns="182880" tIns="146304" rIns="182880" bIns="146304"/>
-          <a:lstStyle>
-            <a:lvl1pPr>
-              <a:defRPr>
-                <a:solidFill>
-                  <a:schemeClr val="bg1"/>
-                </a:solidFill>
-              </a:defRPr>
-            </a:lvl1pPr>
-          </a:lstStyle>
-          <a:p>
-            <a:r>
-              <a:rPr lang="en-US" dirty="0"/>
-              <a:t>Title here</a:t>
-            </a:r>
-          </a:p>
-        </p:txBody>
-      </p:sp>
-      <p:pic>
-        <p:nvPicPr>
-          <p:cNvPr id="8" name="Picture 7">
-            <a:extLst>
-              <a:ext uri="{FF2B5EF4-FFF2-40B4-BE49-F238E27FC236}">
-                <a16:creationId xmlns:a16="http://schemas.microsoft.com/office/drawing/2014/main" id="{05CAE2DB-60DA-C440-A99F-9A4203E7FA74}"/>
-              </a:ext>
-            </a:extLst>
-          </p:cNvPr>
-          <p:cNvPicPr>
-            <a:picLocks noChangeAspect="1"/>
-          </p:cNvPicPr>
-          <p:nvPr userDrawn="1"/>
-        </p:nvPicPr>
-        <p:blipFill>
-          <a:blip r:embed="rId2">
-            <a:extLst>
-              <a:ext uri="{28A0092B-C50C-407E-A947-70E740481C1C}">
-                <a14:useLocalDpi xmlns:a14="http://schemas.microsoft.com/office/drawing/2010/main" val="0"/>
-              </a:ext>
-            </a:extLst>
-          </a:blip>
-          <a:stretch>
-            <a:fillRect/>
-          </a:stretch>
-        </p:blipFill>
-        <p:spPr>
-          <a:xfrm>
-            <a:off x="13571836" y="7338230"/>
-            <a:ext cx="635000" cy="381000"/>
-          </a:xfrm>
-          <a:prstGeom prst="rect">
-            <a:avLst/>
-          </a:prstGeom>
-        </p:spPr>
-      </p:pic>
-      <p:sp>
-        <p:nvSpPr>
-          <p:cNvPr id="10" name="TextBox 3">
-            <a:extLst>
-              <a:ext uri="{FF2B5EF4-FFF2-40B4-BE49-F238E27FC236}">
-                <a16:creationId xmlns:a16="http://schemas.microsoft.com/office/drawing/2014/main" id="{E6C29387-8DE3-1947-9C9D-EAAD17F88D7D}"/>
-              </a:ext>
-            </a:extLst>
-          </p:cNvPr>
-          <p:cNvSpPr txBox="1">
-            <a:spLocks noChangeArrowheads="1"/>
-          </p:cNvSpPr>
-          <p:nvPr userDrawn="1"/>
-        </p:nvSpPr>
-        <p:spPr bwMode="white">
-          <a:xfrm>
-            <a:off x="161926" y="7580731"/>
-            <a:ext cx="3962400" cy="138499"/>
-          </a:xfrm>
-          <a:prstGeom prst="rect">
-            <a:avLst/>
-          </a:prstGeom>
-          <a:noFill/>
-          <a:ln>
-            <a:noFill/>
-          </a:ln>
-          <a:extLst>
-            <a:ext uri="{909E8E84-426E-40DD-AFC4-6F175D3DCCD1}">
-              <a14:hiddenFill xmlns:a14="http://schemas.microsoft.com/office/drawing/2010/main">
-                <a:solidFill>
-                  <a:srgbClr val="FFFFFF"/>
-                </a:solidFill>
-              </a14:hiddenFill>
-            </a:ext>
-            <a:ext uri="{91240B29-F687-4F45-9708-019B960494DF}">
-              <a14:hiddenLine xmlns:a14="http://schemas.microsoft.com/office/drawing/2010/main" w="9525">
-                <a:solidFill>
-                  <a:srgbClr val="000000"/>
-                </a:solidFill>
-                <a:miter lim="800000"/>
-                <a:headEnd/>
-                <a:tailEnd/>
-              </a14:hiddenLine>
-            </a:ext>
-          </a:extLst>
-        </p:spPr>
-        <p:txBody>
-          <a:bodyPr wrap="square" lIns="0" tIns="0" rIns="0" bIns="0">
-            <a:spAutoFit/>
-          </a:bodyPr>
-          <a:lstStyle>
-            <a:lvl1pPr>
-              <a:defRPr>
-                <a:solidFill>
-                  <a:schemeClr val="tx1"/>
-                </a:solidFill>
-                <a:latin typeface="Arial" charset="0"/>
-              </a:defRPr>
-            </a:lvl1pPr>
-            <a:lvl2pPr marL="742950" indent="-285750">
-              <a:defRPr>
-                <a:solidFill>
-                  <a:schemeClr val="tx1"/>
-                </a:solidFill>
-                <a:latin typeface="Arial" charset="0"/>
-              </a:defRPr>
-            </a:lvl2pPr>
-            <a:lvl3pPr marL="1143000" indent="-228600">
-              <a:defRPr>
-                <a:solidFill>
-                  <a:schemeClr val="tx1"/>
-                </a:solidFill>
-                <a:latin typeface="Arial" charset="0"/>
-              </a:defRPr>
-            </a:lvl3pPr>
-            <a:lvl4pPr marL="1600200" indent="-228600">
-              <a:defRPr>
-                <a:solidFill>
-                  <a:schemeClr val="tx1"/>
-                </a:solidFill>
-                <a:latin typeface="Arial" charset="0"/>
-              </a:defRPr>
-            </a:lvl4pPr>
-            <a:lvl5pPr marL="2057400" indent="-228600">
-              <a:defRPr>
-                <a:solidFill>
-                  <a:schemeClr val="tx1"/>
-                </a:solidFill>
-                <a:latin typeface="Arial" charset="0"/>
-              </a:defRPr>
-            </a:lvl5pPr>
-            <a:lvl6pPr marL="2514600" indent="-228600" defTabSz="457200" fontAlgn="base">
-              <a:spcBef>
-                <a:spcPct val="0"/>
-              </a:spcBef>
-              <a:spcAft>
-                <a:spcPct val="0"/>
-              </a:spcAft>
-              <a:defRPr>
-                <a:solidFill>
-                  <a:schemeClr val="tx1"/>
-                </a:solidFill>
-                <a:latin typeface="Arial" charset="0"/>
-              </a:defRPr>
-            </a:lvl6pPr>
-            <a:lvl7pPr marL="2971800" indent="-228600" defTabSz="457200" fontAlgn="base">
-              <a:spcBef>
-                <a:spcPct val="0"/>
-              </a:spcBef>
-              <a:spcAft>
-                <a:spcPct val="0"/>
-              </a:spcAft>
-              <a:defRPr>
-                <a:solidFill>
-                  <a:schemeClr val="tx1"/>
-                </a:solidFill>
-                <a:latin typeface="Arial" charset="0"/>
-              </a:defRPr>
-            </a:lvl7pPr>
-            <a:lvl8pPr marL="3429000" indent="-228600" defTabSz="457200" fontAlgn="base">
-              <a:spcBef>
-                <a:spcPct val="0"/>
-              </a:spcBef>
-              <a:spcAft>
-                <a:spcPct val="0"/>
-              </a:spcAft>
-              <a:defRPr>
-                <a:solidFill>
-                  <a:schemeClr val="tx1"/>
-                </a:solidFill>
-                <a:latin typeface="Arial" charset="0"/>
-              </a:defRPr>
-            </a:lvl8pPr>
-            <a:lvl9pPr marL="3886200" indent="-228600" defTabSz="457200" fontAlgn="base">
-              <a:spcBef>
-                <a:spcPct val="0"/>
-              </a:spcBef>
-              <a:spcAft>
-                <a:spcPct val="0"/>
-              </a:spcAft>
-              <a:defRPr>
-                <a:solidFill>
-                  <a:schemeClr val="tx1"/>
-                </a:solidFill>
-                <a:latin typeface="Arial" charset="0"/>
-              </a:defRPr>
-            </a:lvl9pPr>
-          </a:lstStyle>
-          <a:p>
-            <a:pPr algn="ctr" eaLnBrk="1" hangingPunct="1"/>
-            <a:r>
-              <a:rPr lang="en-US" altLang="x-none" sz="900" b="0" i="0" dirty="0">
-                <a:solidFill>
-                  <a:schemeClr val="bg1"/>
-                </a:solidFill>
-                <a:latin typeface="Amazon Ember" charset="0"/>
-                <a:ea typeface="Amazon Ember" charset="0"/>
-                <a:cs typeface="Amazon Ember" charset="0"/>
-              </a:rPr>
-              <a:t>© 2019, Amazon Web Services, Inc. or its affiliates. All rights reserved.</a:t>
-            </a:r>
-          </a:p>
-        </p:txBody>
-      </p:sp>
-    </p:spTree>
-    <p:extLst>
-      <p:ext uri="{BB962C8B-B14F-4D97-AF65-F5344CB8AC3E}">
-        <p14:creationId xmlns:p14="http://schemas.microsoft.com/office/powerpoint/2010/main" val="3745635217"/>
-      </p:ext>
-    </p:extLst>
-  </p:cSld>
-  <p:clrMapOvr>
-    <a:masterClrMapping/>
-  </p:clrMapOvr>
-  <p:transition>
-    <p:fade/>
-  </p:transition>
-</p:sldLayout>
-</file>
-
 <file path=ppt/slideLayouts/slideLayout3.xml><?xml version="1.0" encoding="utf-8"?>
 <p:sldLayout xmlns:a="http://schemas.openxmlformats.org/drawingml/2006/main" xmlns:r="http://schemas.openxmlformats.org/officeDocument/2006/relationships" xmlns:p="http://schemas.openxmlformats.org/presentationml/2006/main" preserve="1" userDrawn="1">
   <p:cSld name="Table_of_Contents">
@@ -7020,67 +6678,6 @@
           </a:p>
         </p:txBody>
       </p:sp>
-      <p:sp>
-        <p:nvSpPr>
-          <p:cNvPr id="13" name="TextBox 12">
-            <a:extLst>
-              <a:ext uri="{FF2B5EF4-FFF2-40B4-BE49-F238E27FC236}">
-                <a16:creationId xmlns:a16="http://schemas.microsoft.com/office/drawing/2014/main" id="{70CBEEB6-F001-424E-AC78-043787D1A721}"/>
-              </a:ext>
-            </a:extLst>
-          </p:cNvPr>
-          <p:cNvSpPr txBox="1"/>
-          <p:nvPr userDrawn="1"/>
-        </p:nvSpPr>
-        <p:spPr>
-          <a:xfrm>
-            <a:off x="538863" y="7683901"/>
-            <a:ext cx="7115490" cy="172355"/>
-          </a:xfrm>
-          <a:prstGeom prst="rect">
-            <a:avLst/>
-          </a:prstGeom>
-          <a:noFill/>
-        </p:spPr>
-        <p:txBody>
-          <a:bodyPr wrap="square" lIns="0" tIns="0" rIns="0" bIns="0" rtlCol="0">
-            <a:spAutoFit/>
-          </a:bodyPr>
-          <a:lstStyle/>
-          <a:p>
-            <a:pPr marL="0" marR="0" indent="0" algn="l" defTabSz="731520" rtl="0" eaLnBrk="1" fontAlgn="auto" latinLnBrk="0" hangingPunct="1">
-              <a:lnSpc>
-                <a:spcPct val="100000"/>
-              </a:lnSpc>
-              <a:spcBef>
-                <a:spcPts val="0"/>
-              </a:spcBef>
-              <a:spcAft>
-                <a:spcPts val="0"/>
-              </a:spcAft>
-              <a:buClrTx/>
-              <a:buSzTx/>
-              <a:buFontTx/>
-              <a:buNone/>
-              <a:tabLst/>
-              <a:defRPr/>
-            </a:pPr>
-            <a:r>
-              <a:rPr lang="en-US" sz="1120" b="0" i="0" dirty="0">
-                <a:solidFill>
-                  <a:schemeClr val="tx1">
-                    <a:lumMod val="75000"/>
-                  </a:schemeClr>
-                </a:solidFill>
-                <a:latin typeface="Amazon Ember" panose="020B0603020204020204" pitchFamily="34" charset="0"/>
-                <a:ea typeface="Amazon Ember" panose="020B0603020204020204" pitchFamily="34" charset="0"/>
-                <a:cs typeface="Amazon Ember" panose="020B0603020204020204" pitchFamily="34" charset="0"/>
-              </a:rPr>
-              <a:t>© 2019, Amazon Web Services, Inc. or its Affiliates. </a:t>
-            </a:r>
-          </a:p>
-        </p:txBody>
-      </p:sp>
     </p:spTree>
     <p:extLst>
       <p:ext uri="{BB962C8B-B14F-4D97-AF65-F5344CB8AC3E}">
@@ -7111,104 +6708,6 @@
           <a:chExt cx="0" cy="0"/>
         </a:xfrm>
       </p:grpSpPr>
-      <p:sp>
-        <p:nvSpPr>
-          <p:cNvPr id="2" name="Title 1"/>
-          <p:cNvSpPr>
-            <a:spLocks noGrp="1"/>
-          </p:cNvSpPr>
-          <p:nvPr>
-            <p:ph type="title"/>
-          </p:nvPr>
-        </p:nvSpPr>
-        <p:spPr>
-          <a:xfrm>
-            <a:off x="548640" y="3108960"/>
-            <a:ext cx="12435840" cy="1488168"/>
-          </a:xfrm>
-        </p:spPr>
-        <p:txBody>
-          <a:bodyPr anchor="ctr">
-            <a:noAutofit/>
-          </a:bodyPr>
-          <a:lstStyle>
-            <a:lvl1pPr algn="l">
-              <a:defRPr sz="6400" b="1" cap="none">
-                <a:solidFill>
-                  <a:schemeClr val="tx1"/>
-                </a:solidFill>
-              </a:defRPr>
-            </a:lvl1pPr>
-          </a:lstStyle>
-          <a:p>
-            <a:r>
-              <a:rPr lang="en-US" dirty="0"/>
-              <a:t>Click to edit Master title style</a:t>
-            </a:r>
-          </a:p>
-        </p:txBody>
-      </p:sp>
-      <p:sp>
-        <p:nvSpPr>
-          <p:cNvPr id="11" name="TextBox 10">
-            <a:extLst>
-              <a:ext uri="{FF2B5EF4-FFF2-40B4-BE49-F238E27FC236}">
-                <a16:creationId xmlns:a16="http://schemas.microsoft.com/office/drawing/2014/main" id="{CD8FC8CD-B545-7E4C-83EF-5B9D7B0B315F}"/>
-              </a:ext>
-            </a:extLst>
-          </p:cNvPr>
-          <p:cNvSpPr txBox="1"/>
-          <p:nvPr userDrawn="1"/>
-        </p:nvSpPr>
-        <p:spPr>
-          <a:xfrm>
-            <a:off x="538863" y="7683901"/>
-            <a:ext cx="7115490" cy="172355"/>
-          </a:xfrm>
-          <a:prstGeom prst="rect">
-            <a:avLst/>
-          </a:prstGeom>
-          <a:noFill/>
-        </p:spPr>
-        <p:txBody>
-          <a:bodyPr wrap="square" lIns="0" tIns="0" rIns="0" bIns="0" rtlCol="0">
-            <a:spAutoFit/>
-          </a:bodyPr>
-          <a:lstStyle/>
-          <a:p>
-            <a:pPr marL="0" marR="0" indent="0" algn="l" defTabSz="731520" rtl="0" eaLnBrk="1" fontAlgn="auto" latinLnBrk="0" hangingPunct="1">
-              <a:lnSpc>
-                <a:spcPct val="100000"/>
-              </a:lnSpc>
-              <a:spcBef>
-                <a:spcPts val="0"/>
-              </a:spcBef>
-              <a:spcAft>
-                <a:spcPts val="0"/>
-              </a:spcAft>
-              <a:buClrTx/>
-              <a:buSzTx/>
-              <a:buFontTx/>
-              <a:buNone/>
-              <a:tabLst/>
-              <a:defRPr/>
-            </a:pPr>
-            <a:r>
-              <a:rPr lang="en-US" sz="1120" b="0" i="0" dirty="0">
-                <a:solidFill>
-                  <a:schemeClr val="tx1">
-                    <a:lumMod val="75000"/>
-                  </a:schemeClr>
-                </a:solidFill>
-                <a:latin typeface="Amazon Ember" panose="020B0603020204020204" pitchFamily="34" charset="0"/>
-                <a:ea typeface="Amazon Ember" panose="020B0603020204020204" pitchFamily="34" charset="0"/>
-                <a:cs typeface="Amazon Ember" panose="020B0603020204020204" pitchFamily="34" charset="0"/>
-              </a:rPr>
-              <a:t>© 2019, Amazon Web Services, Inc. or its Affiliates. </a:t>
-            </a:r>
-          </a:p>
-        </p:txBody>
-      </p:sp>
       <p:pic>
         <p:nvPicPr>
           <p:cNvPr id="13" name="Picture 12">
@@ -7239,6 +6738,43 @@
           </a:prstGeom>
         </p:spPr>
       </p:pic>
+      <p:sp>
+        <p:nvSpPr>
+          <p:cNvPr id="2" name="Title 1"/>
+          <p:cNvSpPr>
+            <a:spLocks noGrp="1"/>
+          </p:cNvSpPr>
+          <p:nvPr>
+            <p:ph type="title"/>
+          </p:nvPr>
+        </p:nvSpPr>
+        <p:spPr>
+          <a:xfrm>
+            <a:off x="548640" y="3108960"/>
+            <a:ext cx="12435840" cy="1488168"/>
+          </a:xfrm>
+        </p:spPr>
+        <p:txBody>
+          <a:bodyPr anchor="ctr">
+            <a:noAutofit/>
+          </a:bodyPr>
+          <a:lstStyle>
+            <a:lvl1pPr algn="l">
+              <a:defRPr sz="6400" b="1" cap="none">
+                <a:solidFill>
+                  <a:schemeClr val="tx1"/>
+                </a:solidFill>
+              </a:defRPr>
+            </a:lvl1pPr>
+          </a:lstStyle>
+          <a:p>
+            <a:r>
+              <a:rPr lang="en-US" dirty="0"/>
+              <a:t>Click to edit Master title style</a:t>
+            </a:r>
+          </a:p>
+        </p:txBody>
+      </p:sp>
     </p:spTree>
     <p:extLst>
       <p:ext uri="{BB962C8B-B14F-4D97-AF65-F5344CB8AC3E}">
@@ -7269,104 +6805,6 @@
           <a:chExt cx="0" cy="0"/>
         </a:xfrm>
       </p:grpSpPr>
-      <p:sp>
-        <p:nvSpPr>
-          <p:cNvPr id="2" name="Title 1"/>
-          <p:cNvSpPr>
-            <a:spLocks noGrp="1"/>
-          </p:cNvSpPr>
-          <p:nvPr>
-            <p:ph type="title"/>
-          </p:nvPr>
-        </p:nvSpPr>
-        <p:spPr>
-          <a:xfrm>
-            <a:off x="548640" y="3108960"/>
-            <a:ext cx="12435840" cy="1488168"/>
-          </a:xfrm>
-        </p:spPr>
-        <p:txBody>
-          <a:bodyPr anchor="ctr">
-            <a:noAutofit/>
-          </a:bodyPr>
-          <a:lstStyle>
-            <a:lvl1pPr algn="l">
-              <a:defRPr sz="6400" b="1" cap="none">
-                <a:solidFill>
-                  <a:schemeClr val="tx1"/>
-                </a:solidFill>
-              </a:defRPr>
-            </a:lvl1pPr>
-          </a:lstStyle>
-          <a:p>
-            <a:r>
-              <a:rPr lang="en-US" dirty="0"/>
-              <a:t>Click to edit Master title style</a:t>
-            </a:r>
-          </a:p>
-        </p:txBody>
-      </p:sp>
-      <p:sp>
-        <p:nvSpPr>
-          <p:cNvPr id="11" name="TextBox 10">
-            <a:extLst>
-              <a:ext uri="{FF2B5EF4-FFF2-40B4-BE49-F238E27FC236}">
-                <a16:creationId xmlns:a16="http://schemas.microsoft.com/office/drawing/2014/main" id="{CD8FC8CD-B545-7E4C-83EF-5B9D7B0B315F}"/>
-              </a:ext>
-            </a:extLst>
-          </p:cNvPr>
-          <p:cNvSpPr txBox="1"/>
-          <p:nvPr userDrawn="1"/>
-        </p:nvSpPr>
-        <p:spPr>
-          <a:xfrm>
-            <a:off x="538863" y="7683901"/>
-            <a:ext cx="7115490" cy="172355"/>
-          </a:xfrm>
-          <a:prstGeom prst="rect">
-            <a:avLst/>
-          </a:prstGeom>
-          <a:noFill/>
-        </p:spPr>
-        <p:txBody>
-          <a:bodyPr wrap="square" lIns="0" tIns="0" rIns="0" bIns="0" rtlCol="0">
-            <a:spAutoFit/>
-          </a:bodyPr>
-          <a:lstStyle/>
-          <a:p>
-            <a:pPr marL="0" marR="0" indent="0" algn="l" defTabSz="731520" rtl="0" eaLnBrk="1" fontAlgn="auto" latinLnBrk="0" hangingPunct="1">
-              <a:lnSpc>
-                <a:spcPct val="100000"/>
-              </a:lnSpc>
-              <a:spcBef>
-                <a:spcPts val="0"/>
-              </a:spcBef>
-              <a:spcAft>
-                <a:spcPts val="0"/>
-              </a:spcAft>
-              <a:buClrTx/>
-              <a:buSzTx/>
-              <a:buFontTx/>
-              <a:buNone/>
-              <a:tabLst/>
-              <a:defRPr/>
-            </a:pPr>
-            <a:r>
-              <a:rPr lang="en-US" sz="1120" b="0" i="0" dirty="0">
-                <a:solidFill>
-                  <a:schemeClr val="tx1">
-                    <a:lumMod val="75000"/>
-                  </a:schemeClr>
-                </a:solidFill>
-                <a:latin typeface="Amazon Ember" panose="020B0603020204020204" pitchFamily="34" charset="0"/>
-                <a:ea typeface="Amazon Ember" panose="020B0603020204020204" pitchFamily="34" charset="0"/>
-                <a:cs typeface="Amazon Ember" panose="020B0603020204020204" pitchFamily="34" charset="0"/>
-              </a:rPr>
-              <a:t>© 2019, Amazon Web Services, Inc. or its Affiliates. </a:t>
-            </a:r>
-          </a:p>
-        </p:txBody>
-      </p:sp>
       <p:pic>
         <p:nvPicPr>
           <p:cNvPr id="4" name="Picture 3">
@@ -7397,6 +6835,43 @@
           </a:prstGeom>
         </p:spPr>
       </p:pic>
+      <p:sp>
+        <p:nvSpPr>
+          <p:cNvPr id="2" name="Title 1"/>
+          <p:cNvSpPr>
+            <a:spLocks noGrp="1"/>
+          </p:cNvSpPr>
+          <p:nvPr>
+            <p:ph type="title"/>
+          </p:nvPr>
+        </p:nvSpPr>
+        <p:spPr>
+          <a:xfrm>
+            <a:off x="548640" y="3108960"/>
+            <a:ext cx="12435840" cy="1488168"/>
+          </a:xfrm>
+        </p:spPr>
+        <p:txBody>
+          <a:bodyPr anchor="ctr">
+            <a:noAutofit/>
+          </a:bodyPr>
+          <a:lstStyle>
+            <a:lvl1pPr algn="l">
+              <a:defRPr sz="6400" b="1" cap="none">
+                <a:solidFill>
+                  <a:schemeClr val="tx1"/>
+                </a:solidFill>
+              </a:defRPr>
+            </a:lvl1pPr>
+          </a:lstStyle>
+          <a:p>
+            <a:r>
+              <a:rPr lang="en-US" dirty="0"/>
+              <a:t>Click to edit Master title style</a:t>
+            </a:r>
+          </a:p>
+        </p:txBody>
+      </p:sp>
     </p:spTree>
     <p:extLst>
       <p:ext uri="{BB962C8B-B14F-4D97-AF65-F5344CB8AC3E}">
@@ -7548,7 +7023,7 @@
                 <a:ea typeface="Amazon Ember" panose="020B0603020204020204" pitchFamily="34" charset="0"/>
                 <a:cs typeface="Amazon Ember" panose="020B0603020204020204" pitchFamily="34" charset="0"/>
               </a:rPr>
-              <a:t>© 2019, Amazon Web Services, Inc. or its Affiliates. </a:t>
+              <a:t>© 2021, Amazon Web Services, Inc. or its Affiliates. </a:t>
             </a:r>
           </a:p>
         </p:txBody>
@@ -7736,7 +7211,7 @@
                 <a:ea typeface="Amazon Ember" panose="020B0603020204020204" pitchFamily="34" charset="0"/>
                 <a:cs typeface="Amazon Ember" panose="020B0603020204020204" pitchFamily="34" charset="0"/>
               </a:rPr>
-              <a:t>© 2019, Amazon Web Services, Inc. or its Affiliates. </a:t>
+              <a:t>© 2021, Amazon Web Services, Inc. or its Affiliates. </a:t>
             </a:r>
           </a:p>
         </p:txBody>
@@ -7894,7 +7369,7 @@
                 <a:ea typeface="Amazon Ember" panose="020B0603020204020204" pitchFamily="34" charset="0"/>
                 <a:cs typeface="Amazon Ember" panose="020B0603020204020204" pitchFamily="34" charset="0"/>
               </a:rPr>
-              <a:t>© 2019, Amazon Web Services, Inc. or its Affiliates. </a:t>
+              <a:t>© 2021, Amazon Web Services, Inc. or its Affiliates. </a:t>
             </a:r>
           </a:p>
         </p:txBody>
@@ -8107,7 +7582,7 @@
                 <a:ea typeface="Amazon Ember" panose="020B0603020204020204" pitchFamily="34" charset="0"/>
                 <a:cs typeface="Amazon Ember" panose="020B0603020204020204" pitchFamily="34" charset="0"/>
               </a:rPr>
-              <a:t>© 2019, Amazon Web Services, Inc. or its Affiliates. </a:t>
+              <a:t>© 2021, Amazon Web Services, Inc. or its Affiliates. </a:t>
             </a:r>
           </a:p>
         </p:txBody>
@@ -8127,7 +7602,7 @@
           <p:nvPr userDrawn="1"/>
         </p:nvPicPr>
         <p:blipFill>
-          <a:blip r:embed="rId30"/>
+          <a:blip r:embed="rId29"/>
           <a:stretch>
             <a:fillRect/>
           </a:stretch>
@@ -8178,7 +7653,6 @@
     <p:sldLayoutId id="2147483706" r:id="rId25"/>
     <p:sldLayoutId id="2147483709" r:id="rId26"/>
     <p:sldLayoutId id="2147483710" r:id="rId27"/>
-    <p:sldLayoutId id="2147483712" r:id="rId28"/>
   </p:sldLayoutIdLst>
   <p:txStyles>
     <p:titleStyle>
@@ -11870,78 +11344,6 @@
           </a:prstGeom>
         </p:spPr>
       </p:pic>
-      <p:sp>
-        <p:nvSpPr>
-          <p:cNvPr id="25" name="TextBox 24">
-            <a:extLst>
-              <a:ext uri="{FF2B5EF4-FFF2-40B4-BE49-F238E27FC236}">
-                <a16:creationId xmlns:a16="http://schemas.microsoft.com/office/drawing/2014/main" id="{8F5F3E92-8A7B-7C4F-98A2-FE3B63CC22E8}"/>
-              </a:ext>
-            </a:extLst>
-          </p:cNvPr>
-          <p:cNvSpPr txBox="1"/>
-          <p:nvPr/>
-        </p:nvSpPr>
-        <p:spPr>
-          <a:xfrm>
-            <a:off x="5239699" y="2347964"/>
-            <a:ext cx="2301904" cy="307777"/>
-          </a:xfrm>
-          <a:prstGeom prst="rect">
-            <a:avLst/>
-          </a:prstGeom>
-          <a:noFill/>
-        </p:spPr>
-        <p:txBody>
-          <a:bodyPr wrap="square" rtlCol="0">
-            <a:spAutoFit/>
-          </a:bodyPr>
-          <a:lstStyle/>
-          <a:p>
-            <a:pPr algn="ctr"/>
-            <a:r>
-              <a:rPr lang="en-US" sz="1400" dirty="0"/>
-              <a:t>AWS Cloud9</a:t>
-            </a:r>
-          </a:p>
-        </p:txBody>
-      </p:sp>
-      <p:pic>
-        <p:nvPicPr>
-          <p:cNvPr id="26" name="Graphic 25">
-            <a:extLst>
-              <a:ext uri="{FF2B5EF4-FFF2-40B4-BE49-F238E27FC236}">
-                <a16:creationId xmlns:a16="http://schemas.microsoft.com/office/drawing/2014/main" id="{F904ADB5-707F-7E4E-8593-CBA355AC4092}"/>
-              </a:ext>
-            </a:extLst>
-          </p:cNvPr>
-          <p:cNvPicPr>
-            <a:picLocks noChangeAspect="1"/>
-          </p:cNvPicPr>
-          <p:nvPr/>
-        </p:nvPicPr>
-        <p:blipFill>
-          <a:blip r:embed="rId12">
-            <a:extLst>
-              <a:ext uri="{96DAC541-7B7A-43D3-8B79-37D633B846F1}">
-                <asvg:svgBlip xmlns:asvg="http://schemas.microsoft.com/office/drawing/2016/SVG/main" r:embed="rId13"/>
-              </a:ext>
-            </a:extLst>
-          </a:blip>
-          <a:stretch>
-            <a:fillRect/>
-          </a:stretch>
-        </p:blipFill>
-        <p:spPr>
-          <a:xfrm>
-            <a:off x="6035051" y="1522864"/>
-            <a:ext cx="711200" cy="711200"/>
-          </a:xfrm>
-          <a:prstGeom prst="rect">
-            <a:avLst/>
-          </a:prstGeom>
-        </p:spPr>
-      </p:pic>
       <p:cxnSp>
         <p:nvCxnSpPr>
           <p:cNvPr id="53" name="Elbow Connector 52">
@@ -12212,10 +11614,10 @@
           <p:nvPr/>
         </p:nvPicPr>
         <p:blipFill>
-          <a:blip r:embed="rId14">
+          <a:blip r:embed="rId12">
             <a:extLst>
               <a:ext uri="{96DAC541-7B7A-43D3-8B79-37D633B846F1}">
-                <asvg:svgBlip xmlns:asvg="http://schemas.microsoft.com/office/drawing/2016/SVG/main" r:embed="rId15"/>
+                <asvg:svgBlip xmlns:asvg="http://schemas.microsoft.com/office/drawing/2016/SVG/main" r:embed="rId13"/>
               </a:ext>
             </a:extLst>
           </a:blip>
@@ -12494,238 +11896,10 @@
       </p:cxnSp>
       <p:sp>
         <p:nvSpPr>
-          <p:cNvPr id="92" name="TextBox 91">
+          <p:cNvPr id="125" name="Rectangle 124">
             <a:extLst>
               <a:ext uri="{FF2B5EF4-FFF2-40B4-BE49-F238E27FC236}">
-                <a16:creationId xmlns:a16="http://schemas.microsoft.com/office/drawing/2014/main" id="{89E2685E-7937-264B-97A9-AE35773480EA}"/>
-              </a:ext>
-            </a:extLst>
-          </p:cNvPr>
-          <p:cNvSpPr txBox="1"/>
-          <p:nvPr/>
-        </p:nvSpPr>
-        <p:spPr>
-          <a:xfrm>
-            <a:off x="7128509" y="2357803"/>
-            <a:ext cx="2301904" cy="307777"/>
-          </a:xfrm>
-          <a:prstGeom prst="rect">
-            <a:avLst/>
-          </a:prstGeom>
-          <a:noFill/>
-        </p:spPr>
-        <p:txBody>
-          <a:bodyPr wrap="square" rtlCol="0">
-            <a:spAutoFit/>
-          </a:bodyPr>
-          <a:lstStyle/>
-          <a:p>
-            <a:pPr algn="ctr"/>
-            <a:r>
-              <a:rPr lang="en-US" sz="1400" dirty="0"/>
-              <a:t>AWS CloudFormation</a:t>
-            </a:r>
-          </a:p>
-        </p:txBody>
-      </p:sp>
-      <p:pic>
-        <p:nvPicPr>
-          <p:cNvPr id="93" name="Graphic 92">
-            <a:extLst>
-              <a:ext uri="{FF2B5EF4-FFF2-40B4-BE49-F238E27FC236}">
-                <a16:creationId xmlns:a16="http://schemas.microsoft.com/office/drawing/2014/main" id="{4B5584F2-97FC-F748-9FB8-05CAE8DF2571}"/>
-              </a:ext>
-            </a:extLst>
-          </p:cNvPr>
-          <p:cNvPicPr>
-            <a:picLocks noChangeAspect="1"/>
-          </p:cNvPicPr>
-          <p:nvPr/>
-        </p:nvPicPr>
-        <p:blipFill>
-          <a:blip r:embed="rId16">
-            <a:extLst>
-              <a:ext uri="{96DAC541-7B7A-43D3-8B79-37D633B846F1}">
-                <asvg:svgBlip xmlns:asvg="http://schemas.microsoft.com/office/drawing/2016/SVG/main" r:embed="rId17"/>
-              </a:ext>
-            </a:extLst>
-          </a:blip>
-          <a:stretch>
-            <a:fillRect/>
-          </a:stretch>
-        </p:blipFill>
-        <p:spPr>
-          <a:xfrm>
-            <a:off x="7923861" y="1522864"/>
-            <a:ext cx="711200" cy="711200"/>
-          </a:xfrm>
-          <a:prstGeom prst="rect">
-            <a:avLst/>
-          </a:prstGeom>
-        </p:spPr>
-      </p:pic>
-      <p:cxnSp>
-        <p:nvCxnSpPr>
-          <p:cNvPr id="105" name="Elbow Connector 104">
-            <a:extLst>
-              <a:ext uri="{FF2B5EF4-FFF2-40B4-BE49-F238E27FC236}">
-                <a16:creationId xmlns:a16="http://schemas.microsoft.com/office/drawing/2014/main" id="{C42E019B-743B-3F4A-AE06-440818562BB8}"/>
-              </a:ext>
-            </a:extLst>
-          </p:cNvPr>
-          <p:cNvCxnSpPr>
-            <a:cxnSpLocks/>
-            <a:stCxn id="18" idx="3"/>
-            <a:endCxn id="93" idx="3"/>
-          </p:cNvCxnSpPr>
-          <p:nvPr/>
-        </p:nvCxnSpPr>
-        <p:spPr>
-          <a:xfrm flipH="1" flipV="1">
-            <a:off x="8635061" y="1878464"/>
-            <a:ext cx="3790950" cy="2719783"/>
-          </a:xfrm>
-          <a:prstGeom prst="bentConnector3">
-            <a:avLst>
-              <a:gd name="adj1" fmla="val -16482"/>
-            </a:avLst>
-          </a:prstGeom>
-          <a:ln w="12700">
-            <a:solidFill>
-              <a:schemeClr val="tx1">
-                <a:lumMod val="50000"/>
-              </a:schemeClr>
-            </a:solidFill>
-            <a:prstDash val="sysDot"/>
-            <a:headEnd type="triangle"/>
-            <a:tailEnd type="triangle"/>
-          </a:ln>
-          <a:effectLst/>
-        </p:spPr>
-        <p:style>
-          <a:lnRef idx="2">
-            <a:schemeClr val="accent1"/>
-          </a:lnRef>
-          <a:fillRef idx="0">
-            <a:schemeClr val="accent1"/>
-          </a:fillRef>
-          <a:effectRef idx="1">
-            <a:schemeClr val="accent1"/>
-          </a:effectRef>
-          <a:fontRef idx="minor">
-            <a:schemeClr val="tx1"/>
-          </a:fontRef>
-        </p:style>
-      </p:cxnSp>
-      <p:cxnSp>
-        <p:nvCxnSpPr>
-          <p:cNvPr id="109" name="Elbow Connector 108">
-            <a:extLst>
-              <a:ext uri="{FF2B5EF4-FFF2-40B4-BE49-F238E27FC236}">
-                <a16:creationId xmlns:a16="http://schemas.microsoft.com/office/drawing/2014/main" id="{B8E4F189-0CFD-764B-8763-6BBCFF74FB09}"/>
-              </a:ext>
-            </a:extLst>
-          </p:cNvPr>
-          <p:cNvCxnSpPr>
-            <a:cxnSpLocks/>
-            <a:stCxn id="21" idx="3"/>
-            <a:endCxn id="93" idx="3"/>
-          </p:cNvCxnSpPr>
-          <p:nvPr/>
-        </p:nvCxnSpPr>
-        <p:spPr>
-          <a:xfrm flipH="1" flipV="1">
-            <a:off x="8635061" y="1878464"/>
-            <a:ext cx="3790950" cy="4582168"/>
-          </a:xfrm>
-          <a:prstGeom prst="bentConnector3">
-            <a:avLst>
-              <a:gd name="adj1" fmla="val -21306"/>
-            </a:avLst>
-          </a:prstGeom>
-          <a:ln w="12700">
-            <a:solidFill>
-              <a:schemeClr val="tx1">
-                <a:lumMod val="50000"/>
-              </a:schemeClr>
-            </a:solidFill>
-            <a:prstDash val="sysDot"/>
-            <a:headEnd type="triangle"/>
-            <a:tailEnd type="triangle"/>
-          </a:ln>
-          <a:effectLst/>
-        </p:spPr>
-        <p:style>
-          <a:lnRef idx="2">
-            <a:schemeClr val="accent1"/>
-          </a:lnRef>
-          <a:fillRef idx="0">
-            <a:schemeClr val="accent1"/>
-          </a:fillRef>
-          <a:effectRef idx="1">
-            <a:schemeClr val="accent1"/>
-          </a:effectRef>
-          <a:fontRef idx="minor">
-            <a:schemeClr val="tx1"/>
-          </a:fontRef>
-        </p:style>
-      </p:cxnSp>
-      <p:cxnSp>
-        <p:nvCxnSpPr>
-          <p:cNvPr id="118" name="Straight Arrow Connector 117">
-            <a:extLst>
-              <a:ext uri="{FF2B5EF4-FFF2-40B4-BE49-F238E27FC236}">
-                <a16:creationId xmlns:a16="http://schemas.microsoft.com/office/drawing/2014/main" id="{CDB7694B-0DD1-A646-8AB0-E9DE9ED5569A}"/>
-              </a:ext>
-            </a:extLst>
-          </p:cNvPr>
-          <p:cNvCxnSpPr>
-            <a:stCxn id="26" idx="3"/>
-            <a:endCxn id="93" idx="1"/>
-          </p:cNvCxnSpPr>
-          <p:nvPr/>
-        </p:nvCxnSpPr>
-        <p:spPr>
-          <a:xfrm>
-            <a:off x="6746251" y="1878464"/>
-            <a:ext cx="1177610" cy="0"/>
-          </a:xfrm>
-          <a:prstGeom prst="straightConnector1">
-            <a:avLst/>
-          </a:prstGeom>
-          <a:ln w="12700">
-            <a:solidFill>
-              <a:schemeClr val="tx1">
-                <a:lumMod val="50000"/>
-              </a:schemeClr>
-            </a:solidFill>
-            <a:prstDash val="sysDot"/>
-            <a:headEnd type="triangle"/>
-            <a:tailEnd type="triangle"/>
-          </a:ln>
-          <a:effectLst/>
-        </p:spPr>
-        <p:style>
-          <a:lnRef idx="2">
-            <a:schemeClr val="accent1"/>
-          </a:lnRef>
-          <a:fillRef idx="0">
-            <a:schemeClr val="accent1"/>
-          </a:fillRef>
-          <a:effectRef idx="1">
-            <a:schemeClr val="accent1"/>
-          </a:effectRef>
-          <a:fontRef idx="minor">
-            <a:schemeClr val="tx1"/>
-          </a:fontRef>
-        </p:style>
-      </p:cxnSp>
-      <p:sp>
-        <p:nvSpPr>
-          <p:cNvPr id="124" name="Rectangle 123">
-            <a:extLst>
-              <a:ext uri="{FF2B5EF4-FFF2-40B4-BE49-F238E27FC236}">
-                <a16:creationId xmlns:a16="http://schemas.microsoft.com/office/drawing/2014/main" id="{B1396EFD-FF53-AC40-8B98-4FD2C6C65FB9}"/>
+                <a16:creationId xmlns:a16="http://schemas.microsoft.com/office/drawing/2014/main" id="{6C3259D2-B500-6B41-8F97-DDF7B0B7861D}"/>
               </a:ext>
             </a:extLst>
           </p:cNvPr>
@@ -12734,8 +11908,8 @@
         </p:nvSpPr>
         <p:spPr>
           <a:xfrm>
-            <a:off x="5642761" y="1170203"/>
-            <a:ext cx="3666774" cy="1632800"/>
+            <a:off x="661782" y="1170203"/>
+            <a:ext cx="4761515" cy="1632800"/>
           </a:xfrm>
           <a:prstGeom prst="rect">
             <a:avLst/>
@@ -12777,140 +11951,10 @@
             <a:r>
               <a:rPr lang="en-US" sz="1200" dirty="0">
                 <a:solidFill>
-                  <a:srgbClr val="5A6B86"/>
-                </a:solidFill>
-              </a:rPr>
-              <a:t>Cloud9 IDE and CloudFormation deployment</a:t>
-            </a:r>
-          </a:p>
-        </p:txBody>
-      </p:sp>
-      <p:sp>
-        <p:nvSpPr>
-          <p:cNvPr id="125" name="Rectangle 124">
-            <a:extLst>
-              <a:ext uri="{FF2B5EF4-FFF2-40B4-BE49-F238E27FC236}">
-                <a16:creationId xmlns:a16="http://schemas.microsoft.com/office/drawing/2014/main" id="{6C3259D2-B500-6B41-8F97-DDF7B0B7861D}"/>
-              </a:ext>
-            </a:extLst>
-          </p:cNvPr>
-          <p:cNvSpPr/>
-          <p:nvPr/>
-        </p:nvSpPr>
-        <p:spPr>
-          <a:xfrm>
-            <a:off x="661782" y="1170203"/>
-            <a:ext cx="4761515" cy="1632800"/>
-          </a:xfrm>
-          <a:prstGeom prst="rect">
-            <a:avLst/>
-          </a:prstGeom>
-          <a:noFill/>
-          <a:ln w="12700">
-            <a:solidFill>
-              <a:srgbClr val="5A6B86"/>
-            </a:solidFill>
-            <a:prstDash val="dash"/>
-          </a:ln>
-        </p:spPr>
-        <p:style>
-          <a:lnRef idx="2">
-            <a:schemeClr val="accent1">
-              <a:shade val="50000"/>
-            </a:schemeClr>
-          </a:lnRef>
-          <a:fillRef idx="1">
-            <a:schemeClr val="accent1"/>
-          </a:fillRef>
-          <a:effectRef idx="0">
-            <a:schemeClr val="accent1"/>
-          </a:effectRef>
-          <a:fontRef idx="minor">
-            <a:schemeClr val="lt1"/>
-          </a:fontRef>
-        </p:style>
-        <p:txBody>
-          <a:bodyPr rot="0" spcFirstLastPara="0" vertOverflow="overflow" horzOverflow="overflow" vert="horz" wrap="square" lIns="91440" tIns="91440" rIns="91440" bIns="45720" numCol="1" spcCol="0" rtlCol="0" fromWordArt="0" anchor="t" anchorCtr="0" forceAA="0" compatLnSpc="1">
-            <a:prstTxWarp prst="textNoShape">
-              <a:avLst/>
-            </a:prstTxWarp>
-            <a:noAutofit/>
-          </a:bodyPr>
-          <a:lstStyle/>
-          <a:p>
-            <a:pPr algn="ctr"/>
-            <a:r>
-              <a:rPr lang="en-US" sz="1200" dirty="0">
-                <a:solidFill>
                   <a:schemeClr val="tx1"/>
                 </a:solidFill>
               </a:rPr>
               <a:t>Data Exploration, Data Visualization &amp; Analysis</a:t>
-            </a:r>
-          </a:p>
-        </p:txBody>
-      </p:sp>
-      <p:sp>
-        <p:nvSpPr>
-          <p:cNvPr id="126" name="Rectangle 125">
-            <a:extLst>
-              <a:ext uri="{FF2B5EF4-FFF2-40B4-BE49-F238E27FC236}">
-                <a16:creationId xmlns:a16="http://schemas.microsoft.com/office/drawing/2014/main" id="{9BB3109E-68AA-3740-88DE-D7423C6912C2}"/>
-              </a:ext>
-            </a:extLst>
-          </p:cNvPr>
-          <p:cNvSpPr/>
-          <p:nvPr/>
-        </p:nvSpPr>
-        <p:spPr>
-          <a:xfrm>
-            <a:off x="3325345" y="859597"/>
-            <a:ext cx="6105067" cy="2109939"/>
-          </a:xfrm>
-          <a:prstGeom prst="rect">
-            <a:avLst/>
-          </a:prstGeom>
-          <a:noFill/>
-          <a:ln w="12700">
-            <a:solidFill>
-              <a:schemeClr val="accent3"/>
-            </a:solidFill>
-            <a:prstDash val="dash"/>
-          </a:ln>
-        </p:spPr>
-        <p:style>
-          <a:lnRef idx="2">
-            <a:schemeClr val="accent1">
-              <a:shade val="50000"/>
-            </a:schemeClr>
-          </a:lnRef>
-          <a:fillRef idx="1">
-            <a:schemeClr val="accent1"/>
-          </a:fillRef>
-          <a:effectRef idx="0">
-            <a:schemeClr val="accent1"/>
-          </a:effectRef>
-          <a:fontRef idx="minor">
-            <a:schemeClr val="lt1"/>
-          </a:fontRef>
-        </p:style>
-        <p:txBody>
-          <a:bodyPr rot="0" spcFirstLastPara="0" vertOverflow="overflow" horzOverflow="overflow" vert="horz" wrap="square" lIns="91440" tIns="91440" rIns="91440" bIns="45720" numCol="1" spcCol="0" rtlCol="0" fromWordArt="0" anchor="t" anchorCtr="0" forceAA="0" compatLnSpc="1">
-            <a:prstTxWarp prst="textNoShape">
-              <a:avLst/>
-            </a:prstTxWarp>
-            <a:noAutofit/>
-          </a:bodyPr>
-          <a:lstStyle/>
-          <a:p>
-            <a:pPr algn="ctr"/>
-            <a:r>
-              <a:rPr lang="en-US" sz="1200" dirty="0">
-                <a:solidFill>
-                  <a:schemeClr val="accent3"/>
-                </a:solidFill>
-              </a:rPr>
-              <a:t>IDEs</a:t>
             </a:r>
           </a:p>
         </p:txBody>
@@ -14606,6 +13650,12 @@
 </file>
 
 <file path=customXml/item1.xml><?xml version="1.0" encoding="utf-8"?>
+<p:properties xmlns:p="http://schemas.microsoft.com/office/2006/metadata/properties" xmlns:xsi="http://www.w3.org/2001/XMLSchema-instance">
+  <documentManagement/>
+</p:properties>
+</file>
+
+<file path=customXml/item2.xml><?xml version="1.0" encoding="utf-8"?>
 <?mso-contentType ?>
 <FormTemplates xmlns="http://schemas.microsoft.com/sharepoint/v3/contenttype/forms">
   <Display>DocumentLibraryForm</Display>
@@ -14614,7 +13664,7 @@
 </FormTemplates>
 </file>
 
-<file path=customXml/item2.xml><?xml version="1.0" encoding="utf-8"?>
+<file path=customXml/item3.xml><?xml version="1.0" encoding="utf-8"?>
 <ct:contentTypeSchema xmlns:ct="http://schemas.microsoft.com/office/2006/metadata/contentType" xmlns:ma="http://schemas.microsoft.com/office/2006/metadata/properties/metaAttributes" ct:_="" ma:_="" ma:contentTypeName="Document" ma:contentTypeID="0x010100D26A3D6C04DFD740953BA1B2B9E62D60" ma:contentTypeVersion="0" ma:contentTypeDescription="Create a new document." ma:contentTypeScope="" ma:versionID="26617cd14cd3af163c0e97ff614e520a">
   <xsd:schema xmlns:xsd="http://www.w3.org/2001/XMLSchema" xmlns:xs="http://www.w3.org/2001/XMLSchema" xmlns:p="http://schemas.microsoft.com/office/2006/metadata/properties" targetNamespace="http://schemas.microsoft.com/office/2006/metadata/properties" ma:root="true" ma:fieldsID="c64490b4aec6201516c3a874156f37b2">
     <xsd:element name="properties">
@@ -14728,13 +13778,22 @@
 </ct:contentTypeSchema>
 </file>
 
-<file path=customXml/item3.xml><?xml version="1.0" encoding="utf-8"?>
-<p:properties xmlns:p="http://schemas.microsoft.com/office/2006/metadata/properties" xmlns:xsi="http://www.w3.org/2001/XMLSchema-instance">
-  <documentManagement/>
-</p:properties>
+<file path=customXml/itemProps1.xml><?xml version="1.0" encoding="utf-8"?>
+<ds:datastoreItem xmlns:ds="http://schemas.openxmlformats.org/officeDocument/2006/customXml" ds:itemID="{C597C89A-FD0C-431E-81F6-90225B937683}">
+  <ds:schemaRefs>
+    <ds:schemaRef ds:uri="http://schemas.microsoft.com/office/infopath/2007/PartnerControls"/>
+    <ds:schemaRef ds:uri="http://www.w3.org/XML/1998/namespace"/>
+    <ds:schemaRef ds:uri="http://schemas.microsoft.com/office/2006/documentManagement/types"/>
+    <ds:schemaRef ds:uri="http://purl.org/dc/dcmitype/"/>
+    <ds:schemaRef ds:uri="http://schemas.openxmlformats.org/package/2006/metadata/core-properties"/>
+    <ds:schemaRef ds:uri="http://purl.org/dc/terms/"/>
+    <ds:schemaRef ds:uri="http://schemas.microsoft.com/office/2006/metadata/properties"/>
+    <ds:schemaRef ds:uri="http://purl.org/dc/elements/1.1/"/>
+  </ds:schemaRefs>
+</ds:datastoreItem>
 </file>
 
-<file path=customXml/itemProps1.xml><?xml version="1.0" encoding="utf-8"?>
+<file path=customXml/itemProps2.xml><?xml version="1.0" encoding="utf-8"?>
 <ds:datastoreItem xmlns:ds="http://schemas.openxmlformats.org/officeDocument/2006/customXml" ds:itemID="{705B35A6-8B52-46A5-AE45-B98C6459DC10}">
   <ds:schemaRefs>
     <ds:schemaRef ds:uri="http://schemas.microsoft.com/sharepoint/v3/contenttype/forms"/>
@@ -14742,7 +13801,7 @@
 </ds:datastoreItem>
 </file>
 
-<file path=customXml/itemProps2.xml><?xml version="1.0" encoding="utf-8"?>
+<file path=customXml/itemProps3.xml><?xml version="1.0" encoding="utf-8"?>
 <ds:datastoreItem xmlns:ds="http://schemas.openxmlformats.org/officeDocument/2006/customXml" ds:itemID="{51A3258A-222C-4488-825E-7520D001FB75}">
   <ds:schemaRefs>
     <ds:schemaRef ds:uri="http://schemas.microsoft.com/office/2006/metadata/contentType"/>
@@ -14756,19 +13815,4 @@
     <ds:schemaRef ds:uri="http://schemas.microsoft.com/office/infopath/2007/PartnerControls"/>
   </ds:schemaRefs>
 </ds:datastoreItem>
-</file>
-
-<file path=customXml/itemProps3.xml><?xml version="1.0" encoding="utf-8"?>
-<ds:datastoreItem xmlns:ds="http://schemas.openxmlformats.org/officeDocument/2006/customXml" ds:itemID="{C597C89A-FD0C-431E-81F6-90225B937683}">
-  <ds:schemaRefs>
-    <ds:schemaRef ds:uri="http://schemas.microsoft.com/office/infopath/2007/PartnerControls"/>
-    <ds:schemaRef ds:uri="http://www.w3.org/XML/1998/namespace"/>
-    <ds:schemaRef ds:uri="http://schemas.microsoft.com/office/2006/documentManagement/types"/>
-    <ds:schemaRef ds:uri="http://purl.org/dc/dcmitype/"/>
-    <ds:schemaRef ds:uri="http://schemas.openxmlformats.org/package/2006/metadata/core-properties"/>
-    <ds:schemaRef ds:uri="http://purl.org/dc/terms/"/>
-    <ds:schemaRef ds:uri="http://schemas.microsoft.com/office/2006/metadata/properties"/>
-    <ds:schemaRef ds:uri="http://purl.org/dc/elements/1.1/"/>
-  </ds:schemaRefs>
-</ds:datastoreItem>
 </file>
</xml_diff>